<commit_message>
- added sketch of dyn_stat_kombination and included in presentation - added an proposal of a sketch for workflow visualization
</commit_message>
<xml_diff>
--- a/Architektur_GIT.pptx
+++ b/Architektur_GIT.pptx
@@ -1357,7 +1357,7 @@
           <a:p>
             <a:fld id="{F0D12A71-A58E-40BE-A08F-1058245CE28C}" type="datetime1">
               <a:rPr lang="de-DE" altLang="de-DE" sz="800" smtClean="0"/>
-              <a:t>16.12.19</a:t>
+              <a:t>18.12.19</a:t>
             </a:fld>
             <a:r>
               <a:rPr lang="de-DE" altLang="de-DE" sz="800" dirty="0"/>
@@ -3964,31 +3964,41 @@
           </a:p>
         </p:txBody>
       </p:sp>
-      <p:sp>
-        <p:nvSpPr>
-          <p:cNvPr id="3" name="Inhaltsplatzhalter 2">
+      <p:pic>
+        <p:nvPicPr>
+          <p:cNvPr id="14" name="Inhaltsplatzhalter 13" descr="Ein Bild, das Text enthält.&#10;&#10;Automatisch generierte Beschreibung">
             <a:extLst>
               <a:ext uri="{FF2B5EF4-FFF2-40B4-BE49-F238E27FC236}">
-                <a16:creationId xmlns:a16="http://schemas.microsoft.com/office/drawing/2014/main" id="{E8DC4391-02C3-4100-B56D-966624BD717E}"/>
+                <a16:creationId xmlns:a16="http://schemas.microsoft.com/office/drawing/2014/main" id="{8C624C29-CE9F-CF4F-8ACE-E905F660F4EB}"/>
               </a:ext>
             </a:extLst>
           </p:cNvPr>
-          <p:cNvSpPr>
-            <a:spLocks noGrp="1"/>
-          </p:cNvSpPr>
+          <p:cNvPicPr>
+            <a:picLocks noGrp="1" noChangeAspect="1"/>
+          </p:cNvPicPr>
           <p:nvPr>
             <p:ph idx="1"/>
           </p:nvPr>
-        </p:nvSpPr>
-        <p:spPr/>
-        <p:txBody>
-          <a:bodyPr/>
-          <a:lstStyle/>
-          <a:p>
-            <a:endParaRPr lang="de-DE"/>
-          </a:p>
-        </p:txBody>
-      </p:sp>
+        </p:nvPicPr>
+        <p:blipFill>
+          <a:blip r:embed="rId2">
+            <a:extLst>
+              <a:ext uri="{28A0092B-C50C-407E-A947-70E740481C1C}">
+                <a14:useLocalDpi xmlns:a14="http://schemas.microsoft.com/office/drawing/2010/main" val="0"/>
+              </a:ext>
+            </a:extLst>
+          </a:blip>
+          <a:stretch>
+            <a:fillRect/>
+          </a:stretch>
+        </p:blipFill>
+        <p:spPr>
+          <a:xfrm>
+            <a:off x="1835150" y="1555750"/>
+            <a:ext cx="8648700" cy="3746500"/>
+          </a:xfrm>
+        </p:spPr>
+      </p:pic>
       <p:cxnSp>
         <p:nvCxnSpPr>
           <p:cNvPr id="4" name="Gerader Verbinder 3">

</xml_diff>

<commit_message>
Merge presentation into main presentation
</commit_message>
<xml_diff>
--- a/Architektur_GIT.pptx
+++ b/Architektur_GIT.pptx
@@ -16,8 +16,8 @@
     <p:sldId id="261" r:id="rId7"/>
     <p:sldId id="262" r:id="rId8"/>
     <p:sldId id="263" r:id="rId9"/>
-    <p:sldId id="264" r:id="rId10"/>
-    <p:sldId id="265" r:id="rId11"/>
+    <p:sldId id="277" r:id="rId10"/>
+    <p:sldId id="273" r:id="rId11"/>
     <p:sldId id="266" r:id="rId12"/>
     <p:sldId id="267" r:id="rId13"/>
     <p:sldId id="268" r:id="rId14"/>
@@ -168,8 +168,8 @@
             <p14:sldId id="261"/>
             <p14:sldId id="262"/>
             <p14:sldId id="263"/>
-            <p14:sldId id="264"/>
-            <p14:sldId id="265"/>
+            <p14:sldId id="277"/>
+            <p14:sldId id="273"/>
             <p14:sldId id="266"/>
             <p14:sldId id="267"/>
             <p14:sldId id="268"/>
@@ -659,7 +659,7 @@
             <a:fld id="{92C84FA6-9D13-4F89-9D5F-507040849F9F}" type="slidenum">
               <a:rPr lang="de-DE" altLang="de-DE"/>
               <a:pPr/>
-              <a:t>‹Nr.›</a:t>
+              <a:t>‹#›</a:t>
             </a:fld>
             <a:endParaRPr lang="de-DE" altLang="de-DE"/>
           </a:p>
@@ -812,7 +812,7 @@
       </p:grpSpPr>
       <p:sp>
         <p:nvSpPr>
-          <p:cNvPr id="2" name="Folienbildplatzhalter 1"/>
+          <p:cNvPr id="2" name="Slide Image Placeholder 1"/>
           <p:cNvSpPr>
             <a:spLocks noGrp="1" noRot="1" noChangeAspect="1"/>
           </p:cNvSpPr>
@@ -824,7 +824,7 @@
       </p:sp>
       <p:sp>
         <p:nvSpPr>
-          <p:cNvPr id="3" name="Notizenplatzhalter 2"/>
+          <p:cNvPr id="3" name="Notes Placeholder 2"/>
           <p:cNvSpPr>
             <a:spLocks noGrp="1"/>
           </p:cNvSpPr>
@@ -838,67 +838,115 @@
           <a:lstStyle/>
           <a:p>
             <a:r>
-              <a:rPr lang="de-DE" dirty="0"/>
-              <a:t>Anforderungen 1 und 2 allgemein für VCS</a:t>
-            </a:r>
-          </a:p>
-          <a:p>
-            <a:r>
-              <a:rPr lang="de-DE" dirty="0"/>
-              <a:t>3,4,5 konkrete GIT </a:t>
-            </a:r>
-            <a:r>
-              <a:rPr lang="de-DE" dirty="0" err="1"/>
-              <a:t>designanforderungen</a:t>
-            </a:r>
-            <a:r>
-              <a:rPr lang="de-DE" dirty="0"/>
-              <a:t> von </a:t>
-            </a:r>
-            <a:r>
-              <a:rPr lang="de-DE" dirty="0" err="1"/>
-              <a:t>Torvalds</a:t>
-            </a:r>
-            <a:endParaRPr lang="de-DE" dirty="0"/>
-          </a:p>
-          <a:p>
-            <a:endParaRPr lang="de-DE" dirty="0"/>
-          </a:p>
-          <a:p>
-            <a:r>
-              <a:rPr lang="de-DE" dirty="0"/>
-              <a:t>quelle Susan Potter (aus Buch </a:t>
-            </a:r>
-            <a:r>
-              <a:rPr lang="de-DE" dirty="0" err="1"/>
-              <a:t>architecture</a:t>
-            </a:r>
-            <a:r>
-              <a:rPr lang="de-DE" dirty="0"/>
-              <a:t> open </a:t>
-            </a:r>
-            <a:r>
-              <a:rPr lang="de-DE" dirty="0" err="1"/>
-              <a:t>source</a:t>
-            </a:r>
-            <a:r>
-              <a:rPr lang="de-DE" dirty="0"/>
+              <a:rPr lang="en-US" dirty="0"/>
+              <a:t>Blob: </a:t>
+            </a:r>
+            <a:r>
+              <a:rPr lang="en-US" dirty="0" err="1"/>
+              <a:t>Ähnlich</a:t>
+            </a:r>
+            <a:r>
+              <a:rPr lang="en-US" dirty="0"/>
+              <a:t> einer </a:t>
+            </a:r>
+            <a:r>
+              <a:rPr lang="en-US" dirty="0" err="1"/>
+              <a:t>Datei</a:t>
+            </a:r>
+            <a:endParaRPr lang="en-US" dirty="0"/>
+          </a:p>
+          <a:p>
+            <a:r>
+              <a:rPr lang="en-US" dirty="0"/>
+              <a:t>Tree: </a:t>
+            </a:r>
+            <a:r>
+              <a:rPr lang="en-US" dirty="0" err="1"/>
+              <a:t>Ähnlich</a:t>
+            </a:r>
+            <a:r>
+              <a:rPr lang="en-US" dirty="0"/>
+              <a:t> eines </a:t>
+            </a:r>
+            <a:r>
+              <a:rPr lang="en-US" dirty="0" err="1"/>
+              <a:t>Verzeichnisses</a:t>
+            </a:r>
+            <a:endParaRPr lang="en-US" dirty="0"/>
+          </a:p>
+          <a:p>
+            <a:r>
+              <a:rPr lang="en-US" dirty="0"/>
+              <a:t>Commit: </a:t>
+            </a:r>
+            <a:r>
+              <a:rPr lang="en-US" dirty="0" err="1"/>
+              <a:t>Führt</a:t>
+            </a:r>
+            <a:r>
+              <a:rPr lang="en-US" dirty="0"/>
               <a:t> </a:t>
             </a:r>
             <a:r>
-              <a:rPr lang="de-DE" dirty="0" err="1"/>
-              <a:t>stuff</a:t>
-            </a:r>
-            <a:r>
-              <a:rPr lang="de-DE" dirty="0"/>
-              <a:t>)</a:t>
-            </a:r>
+              <a:rPr lang="en-US" dirty="0" err="1"/>
+              <a:t>mehrere</a:t>
+            </a:r>
+            <a:r>
+              <a:rPr lang="en-US" dirty="0"/>
+              <a:t> tree- und blob-</a:t>
+            </a:r>
+            <a:r>
+              <a:rPr lang="en-US" dirty="0" err="1"/>
+              <a:t>Objekte</a:t>
+            </a:r>
+            <a:r>
+              <a:rPr lang="en-US" dirty="0"/>
+              <a:t> zu einer Art Snapshot-</a:t>
+            </a:r>
+            <a:r>
+              <a:rPr lang="en-US" dirty="0" err="1"/>
+              <a:t>Objekt</a:t>
+            </a:r>
+            <a:r>
+              <a:rPr lang="en-US" dirty="0"/>
+              <a:t> </a:t>
+            </a:r>
+            <a:r>
+              <a:rPr lang="en-US" dirty="0" err="1"/>
+              <a:t>zusammen</a:t>
+            </a:r>
+            <a:endParaRPr lang="en-US" dirty="0"/>
+          </a:p>
+          <a:p>
+            <a:r>
+              <a:rPr lang="en-US" dirty="0"/>
+              <a:t>Tag: Pointer-</a:t>
+            </a:r>
+            <a:r>
+              <a:rPr lang="en-US" dirty="0" err="1"/>
+              <a:t>Objekt</a:t>
+            </a:r>
+            <a:r>
+              <a:rPr lang="en-US" dirty="0"/>
+              <a:t> auf einen </a:t>
+            </a:r>
+            <a:r>
+              <a:rPr lang="en-US" dirty="0" err="1"/>
+              <a:t>bestimmten</a:t>
+            </a:r>
+            <a:r>
+              <a:rPr lang="en-US" dirty="0"/>
+              <a:t> Commit</a:t>
+            </a:r>
+          </a:p>
+          <a:p>
+            <a:endParaRPr lang="LID4096" dirty="0"/>
           </a:p>
         </p:txBody>
       </p:sp>
       <p:sp>
         <p:nvSpPr>
-          <p:cNvPr id="4" name="Foliennummernplatzhalter 3"/>
+          <p:cNvPr id="4" name="Slide Number Placeholder 3"/>
           <p:cNvSpPr>
             <a:spLocks noGrp="1"/>
           </p:cNvSpPr>
@@ -914,7 +962,7 @@
             <a:fld id="{92C84FA6-9D13-4F89-9D5F-507040849F9F}" type="slidenum">
               <a:rPr lang="de-DE" altLang="de-DE" smtClean="0"/>
               <a:pPr/>
-              <a:t>14</a:t>
+              <a:t>9</a:t>
             </a:fld>
             <a:endParaRPr lang="de-DE" altLang="de-DE"/>
           </a:p>
@@ -923,7 +971,7 @@
     </p:spTree>
     <p:extLst>
       <p:ext uri="{BB962C8B-B14F-4D97-AF65-F5344CB8AC3E}">
-        <p14:creationId xmlns:p14="http://schemas.microsoft.com/office/powerpoint/2010/main" val="2926927885"/>
+        <p14:creationId xmlns:p14="http://schemas.microsoft.com/office/powerpoint/2010/main" val="230948126"/>
       </p:ext>
     </p:extLst>
   </p:cSld>
@@ -934,6 +982,135 @@
 </file>
 
 <file path=ppt/notesSlides/notesSlide2.xml><?xml version="1.0" encoding="utf-8"?>
+<p:notes xmlns:a="http://schemas.openxmlformats.org/drawingml/2006/main" xmlns:r="http://schemas.openxmlformats.org/officeDocument/2006/relationships" xmlns:p="http://schemas.openxmlformats.org/presentationml/2006/main">
+  <p:cSld>
+    <p:spTree>
+      <p:nvGrpSpPr>
+        <p:cNvPr id="1" name=""/>
+        <p:cNvGrpSpPr/>
+        <p:nvPr/>
+      </p:nvGrpSpPr>
+      <p:grpSpPr>
+        <a:xfrm>
+          <a:off x="0" y="0"/>
+          <a:ext cx="0" cy="0"/>
+          <a:chOff x="0" y="0"/>
+          <a:chExt cx="0" cy="0"/>
+        </a:xfrm>
+      </p:grpSpPr>
+      <p:sp>
+        <p:nvSpPr>
+          <p:cNvPr id="2" name="Slide Image Placeholder 1"/>
+          <p:cNvSpPr>
+            <a:spLocks noGrp="1" noRot="1" noChangeAspect="1"/>
+          </p:cNvSpPr>
+          <p:nvPr>
+            <p:ph type="sldImg"/>
+          </p:nvPr>
+        </p:nvSpPr>
+        <p:spPr/>
+      </p:sp>
+      <p:sp>
+        <p:nvSpPr>
+          <p:cNvPr id="3" name="Notes Placeholder 2"/>
+          <p:cNvSpPr>
+            <a:spLocks noGrp="1"/>
+          </p:cNvSpPr>
+          <p:nvPr>
+            <p:ph type="body" idx="1"/>
+          </p:nvPr>
+        </p:nvSpPr>
+        <p:spPr/>
+        <p:txBody>
+          <a:bodyPr/>
+          <a:lstStyle/>
+          <a:p>
+            <a:r>
+              <a:rPr lang="en-US" dirty="0"/>
+              <a:t>Git-References = Tags</a:t>
+            </a:r>
+          </a:p>
+          <a:p>
+            <a:r>
+              <a:rPr lang="en-US" dirty="0"/>
+              <a:t>Tags: Tags, Remote-HEAD, Remote-Branches, Local-HEAD, Local-Branches</a:t>
+            </a:r>
+          </a:p>
+          <a:p>
+            <a:r>
+              <a:rPr lang="en-US" dirty="0"/>
+              <a:t>Branches: Branches </a:t>
+            </a:r>
+            <a:r>
+              <a:rPr lang="en-US" dirty="0" err="1"/>
+              <a:t>sind</a:t>
+            </a:r>
+            <a:r>
+              <a:rPr lang="en-US" dirty="0"/>
+              <a:t> </a:t>
+            </a:r>
+            <a:r>
+              <a:rPr lang="en-US" dirty="0" err="1"/>
+              <a:t>nur</a:t>
+            </a:r>
+            <a:r>
+              <a:rPr lang="en-US" dirty="0"/>
+              <a:t> Tags, die auf den </a:t>
+            </a:r>
+            <a:r>
+              <a:rPr lang="en-US" dirty="0" err="1"/>
+              <a:t>aktuellsten</a:t>
+            </a:r>
+            <a:r>
+              <a:rPr lang="en-US" dirty="0"/>
+              <a:t> Commit eines Branches </a:t>
+            </a:r>
+            <a:r>
+              <a:rPr lang="en-US" dirty="0" err="1"/>
+              <a:t>zeigen</a:t>
+            </a:r>
+            <a:endParaRPr lang="LID4096" dirty="0"/>
+          </a:p>
+        </p:txBody>
+      </p:sp>
+      <p:sp>
+        <p:nvSpPr>
+          <p:cNvPr id="4" name="Slide Number Placeholder 3"/>
+          <p:cNvSpPr>
+            <a:spLocks noGrp="1"/>
+          </p:cNvSpPr>
+          <p:nvPr>
+            <p:ph type="sldNum" sz="quarter" idx="5"/>
+          </p:nvPr>
+        </p:nvSpPr>
+        <p:spPr/>
+        <p:txBody>
+          <a:bodyPr/>
+          <a:lstStyle/>
+          <a:p>
+            <a:fld id="{92C84FA6-9D13-4F89-9D5F-507040849F9F}" type="slidenum">
+              <a:rPr lang="de-DE" altLang="de-DE" smtClean="0"/>
+              <a:pPr/>
+              <a:t>10</a:t>
+            </a:fld>
+            <a:endParaRPr lang="de-DE" altLang="de-DE"/>
+          </a:p>
+        </p:txBody>
+      </p:sp>
+    </p:spTree>
+    <p:extLst>
+      <p:ext uri="{BB962C8B-B14F-4D97-AF65-F5344CB8AC3E}">
+        <p14:creationId xmlns:p14="http://schemas.microsoft.com/office/powerpoint/2010/main" val="1899401583"/>
+      </p:ext>
+    </p:extLst>
+  </p:cSld>
+  <p:clrMapOvr>
+    <a:masterClrMapping/>
+  </p:clrMapOvr>
+</p:notes>
+</file>
+
+<file path=ppt/notesSlides/notesSlide3.xml><?xml version="1.0" encoding="utf-8"?>
 <p:notes xmlns:a="http://schemas.openxmlformats.org/drawingml/2006/main" xmlns:r="http://schemas.openxmlformats.org/officeDocument/2006/relationships" xmlns:p="http://schemas.openxmlformats.org/presentationml/2006/main">
   <p:cSld>
     <p:spTree>
@@ -977,271 +1154,60 @@
           <a:bodyPr/>
           <a:lstStyle/>
           <a:p>
-            <a:pPr marL="285750" indent="-285750">
-              <a:buFont typeface="Arial" panose="020B0604020202020204" pitchFamily="34" charset="0"/>
-              <a:buChar char="•"/>
-            </a:pPr>
-            <a:r>
-              <a:rPr lang="de-DE" sz="1200" dirty="0"/>
-              <a:t>Gerichtete azyklische Graphen als Repräsentation der Datenstruktur (+1, Strukturierter Ansatz zur Datenspeicherung), (+2, keine </a:t>
-            </a:r>
-            <a:r>
-              <a:rPr lang="de-DE" sz="1200" dirty="0" err="1"/>
-              <a:t>änderung</a:t>
-            </a:r>
-            <a:r>
-              <a:rPr lang="de-DE" sz="1200" dirty="0"/>
-              <a:t> in </a:t>
-            </a:r>
-            <a:r>
-              <a:rPr lang="de-DE" sz="1200" dirty="0" err="1"/>
-              <a:t>dateien</a:t>
-            </a:r>
-            <a:r>
-              <a:rPr lang="de-DE" sz="1200" dirty="0"/>
-              <a:t> bedeutet keine </a:t>
-            </a:r>
-            <a:r>
-              <a:rPr lang="de-DE" sz="1200" dirty="0" err="1"/>
-              <a:t>änderung</a:t>
-            </a:r>
-            <a:r>
-              <a:rPr lang="de-DE" sz="1200" dirty="0"/>
-              <a:t> im </a:t>
-            </a:r>
-            <a:r>
-              <a:rPr lang="de-DE" sz="1200" dirty="0" err="1"/>
-              <a:t>graph</a:t>
-            </a:r>
-            <a:r>
-              <a:rPr lang="de-DE" sz="1200" dirty="0"/>
-              <a:t>), (+3, unterschiedliche </a:t>
-            </a:r>
-            <a:r>
-              <a:rPr lang="de-DE" sz="1200" dirty="0" err="1"/>
-              <a:t>graphen</a:t>
-            </a:r>
-            <a:r>
-              <a:rPr lang="de-DE" sz="1200" dirty="0"/>
-              <a:t> können </a:t>
-            </a:r>
-            <a:r>
-              <a:rPr lang="de-DE" sz="1200" dirty="0" err="1"/>
-              <a:t>gemerged</a:t>
-            </a:r>
-            <a:r>
-              <a:rPr lang="de-DE" sz="1200" dirty="0"/>
-              <a:t> werden und gleiche teile beibehalten werden, ermöglicht </a:t>
-            </a:r>
-            <a:r>
-              <a:rPr lang="de-DE" sz="1200" dirty="0" err="1"/>
-              <a:t>branching</a:t>
-            </a:r>
-            <a:r>
-              <a:rPr lang="de-DE" sz="1200" dirty="0"/>
-              <a:t>), (-5, </a:t>
-            </a:r>
-            <a:r>
-              <a:rPr lang="de-DE" sz="1200" dirty="0" err="1"/>
-              <a:t>repository</a:t>
-            </a:r>
-            <a:r>
-              <a:rPr lang="de-DE" sz="1200" dirty="0"/>
-              <a:t> speichert nicht nur </a:t>
-            </a:r>
-            <a:r>
-              <a:rPr lang="de-DE" sz="1200" dirty="0" err="1"/>
-              <a:t>diffs</a:t>
-            </a:r>
-            <a:r>
-              <a:rPr lang="de-DE" sz="1200" dirty="0"/>
-              <a:t> der </a:t>
-            </a:r>
-            <a:r>
-              <a:rPr lang="de-DE" sz="1200" dirty="0" err="1"/>
-              <a:t>dateien</a:t>
-            </a:r>
-            <a:r>
-              <a:rPr lang="de-DE" sz="1200" dirty="0"/>
-              <a:t> sondern immer den gesamten </a:t>
-            </a:r>
-            <a:r>
-              <a:rPr lang="de-DE" sz="1200" dirty="0" err="1"/>
-              <a:t>graph</a:t>
-            </a:r>
-            <a:r>
-              <a:rPr lang="de-DE" sz="1200" dirty="0"/>
-              <a:t> und </a:t>
-            </a:r>
-            <a:r>
-              <a:rPr lang="de-DE" sz="1200" dirty="0" err="1"/>
-              <a:t>dateiinhalte</a:t>
-            </a:r>
-            <a:r>
-              <a:rPr lang="de-DE" sz="1200" dirty="0"/>
-              <a:t>)</a:t>
-            </a:r>
-          </a:p>
-          <a:p>
-            <a:pPr marL="285750" indent="-285750">
-              <a:buFont typeface="Arial" panose="020B0604020202020204" pitchFamily="34" charset="0"/>
-              <a:buChar char="•"/>
-            </a:pPr>
-            <a:endParaRPr lang="de-DE" sz="1200" dirty="0"/>
-          </a:p>
-          <a:p>
-            <a:pPr marL="285750" indent="-285750">
-              <a:buFont typeface="Arial" panose="020B0604020202020204" pitchFamily="34" charset="0"/>
-              <a:buChar char="•"/>
-            </a:pPr>
-            <a:r>
-              <a:rPr lang="de-DE" sz="1200" dirty="0"/>
-              <a:t>SHAs als Identifier für GIT Objekte (+2, gleicher SHA heißt keine Änderung), (+3, </a:t>
-            </a:r>
-            <a:r>
-              <a:rPr lang="de-DE" sz="1200" dirty="0" err="1"/>
-              <a:t>unique</a:t>
-            </a:r>
-            <a:r>
-              <a:rPr lang="de-DE" sz="1200" dirty="0"/>
+            <a:r>
+              <a:rPr lang="de-DE" dirty="0"/>
+              <a:t>Anforderungen 1 und 2 allgemein für VCS</a:t>
+            </a:r>
+          </a:p>
+          <a:p>
+            <a:r>
+              <a:rPr lang="de-DE" dirty="0"/>
+              <a:t>3,4,5 konkrete GIT </a:t>
+            </a:r>
+            <a:r>
+              <a:rPr lang="de-DE" dirty="0" err="1"/>
+              <a:t>designanforderungen</a:t>
+            </a:r>
+            <a:r>
+              <a:rPr lang="de-DE" dirty="0"/>
+              <a:t> von </a:t>
+            </a:r>
+            <a:r>
+              <a:rPr lang="de-DE" dirty="0" err="1"/>
+              <a:t>Torvalds</a:t>
+            </a:r>
+            <a:endParaRPr lang="de-DE" dirty="0"/>
+          </a:p>
+          <a:p>
+            <a:endParaRPr lang="de-DE" dirty="0"/>
+          </a:p>
+          <a:p>
+            <a:r>
+              <a:rPr lang="de-DE" dirty="0"/>
+              <a:t>quelle Susan Potter (aus Buch </a:t>
+            </a:r>
+            <a:r>
+              <a:rPr lang="de-DE" dirty="0" err="1"/>
+              <a:t>architecture</a:t>
+            </a:r>
+            <a:r>
+              <a:rPr lang="de-DE" dirty="0"/>
+              <a:t> open </a:t>
+            </a:r>
+            <a:r>
+              <a:rPr lang="de-DE" dirty="0" err="1"/>
+              <a:t>source</a:t>
+            </a:r>
+            <a:r>
+              <a:rPr lang="de-DE" dirty="0"/>
               <a:t> </a:t>
             </a:r>
             <a:r>
-              <a:rPr lang="de-DE" sz="1200" dirty="0" err="1"/>
-              <a:t>identifier</a:t>
-            </a:r>
-            <a:r>
-              <a:rPr lang="de-DE" sz="1200" dirty="0"/>
-              <a:t> benötigt um unterschiedliche </a:t>
-            </a:r>
-            <a:r>
-              <a:rPr lang="de-DE" sz="1200" dirty="0" err="1"/>
-              <a:t>bearbeiter</a:t>
-            </a:r>
-            <a:r>
-              <a:rPr lang="de-DE" sz="1200" dirty="0"/>
-              <a:t> festzustellen), (+4, bei kopieren oder anderer </a:t>
-            </a:r>
-            <a:r>
-              <a:rPr lang="de-DE" sz="1200" dirty="0" err="1"/>
-              <a:t>datenkorrumpierung</a:t>
-            </a:r>
-            <a:r>
-              <a:rPr lang="de-DE" sz="1200" dirty="0"/>
-              <a:t> ändert sich der SHA), (+5, vereinfacht </a:t>
-            </a:r>
-            <a:r>
-              <a:rPr lang="de-DE" sz="1200" dirty="0" err="1"/>
-              <a:t>festellen</a:t>
-            </a:r>
-            <a:r>
-              <a:rPr lang="de-DE" sz="1200" dirty="0"/>
-              <a:t> von </a:t>
-            </a:r>
-            <a:r>
-              <a:rPr lang="de-DE" sz="1200" dirty="0" err="1"/>
-              <a:t>diff</a:t>
-            </a:r>
-            <a:r>
-              <a:rPr lang="de-DE" sz="1200" dirty="0"/>
-              <a:t> zwischen zwei </a:t>
-            </a:r>
-            <a:r>
-              <a:rPr lang="de-DE" sz="1200" dirty="0" err="1"/>
-              <a:t>dateien</a:t>
-            </a:r>
-            <a:r>
-              <a:rPr lang="de-DE" sz="1200" dirty="0"/>
-              <a:t>)</a:t>
-            </a:r>
-          </a:p>
-          <a:p>
-            <a:pPr marL="285750" indent="-285750">
-              <a:buFont typeface="Arial" panose="020B0604020202020204" pitchFamily="34" charset="0"/>
-              <a:buChar char="•"/>
-            </a:pPr>
-            <a:endParaRPr lang="de-DE" sz="1200" dirty="0"/>
-          </a:p>
-          <a:p>
-            <a:pPr marL="285750" indent="-285750">
-              <a:buFont typeface="Arial" panose="020B0604020202020204" pitchFamily="34" charset="0"/>
-              <a:buChar char="•"/>
-            </a:pPr>
-            <a:r>
-              <a:rPr lang="de-DE" sz="1200" dirty="0"/>
-              <a:t>Trennung von lokalem und remote Repository (+1, </a:t>
-            </a:r>
-            <a:r>
-              <a:rPr lang="de-DE" sz="1200" dirty="0" err="1"/>
-              <a:t>versionierung</a:t>
-            </a:r>
-            <a:r>
-              <a:rPr lang="de-DE" sz="1200" dirty="0"/>
-              <a:t> gleichzeitig mit (</a:t>
-            </a:r>
-            <a:r>
-              <a:rPr lang="de-DE" sz="1200" dirty="0" err="1"/>
-              <a:t>server</a:t>
-            </a:r>
-            <a:r>
-              <a:rPr lang="de-DE" sz="1200" dirty="0"/>
-              <a:t>)-backup), (+3, offline arbeiten möglich), (+5, wegen offline-fähigkeit)</a:t>
-            </a:r>
-          </a:p>
-          <a:p>
-            <a:pPr marL="285750" indent="-285750">
-              <a:buFont typeface="Arial" panose="020B0604020202020204" pitchFamily="34" charset="0"/>
-              <a:buChar char="•"/>
-            </a:pPr>
-            <a:endParaRPr lang="de-DE" sz="1200" dirty="0"/>
-          </a:p>
-          <a:p>
-            <a:pPr marL="285750" indent="-285750">
-              <a:buFont typeface="Arial" panose="020B0604020202020204" pitchFamily="34" charset="0"/>
-              <a:buChar char="•"/>
-            </a:pPr>
-            <a:r>
-              <a:rPr lang="de-DE" sz="1200" dirty="0"/>
-              <a:t>Definition vier primitiver GIT-Datentypen (+1, </a:t>
-            </a:r>
-            <a:r>
-              <a:rPr lang="de-DE" sz="1200" dirty="0" err="1"/>
-              <a:t>möglicht</a:t>
-            </a:r>
-            <a:r>
-              <a:rPr lang="de-DE" sz="1200" dirty="0"/>
-              <a:t> wenig komplexe und </a:t>
-            </a:r>
-            <a:r>
-              <a:rPr lang="de-DE" sz="1200" dirty="0" err="1"/>
-              <a:t>gleichzeit</a:t>
-            </a:r>
-            <a:r>
-              <a:rPr lang="de-DE" sz="1200" dirty="0"/>
-              <a:t> strukturgebende </a:t>
-            </a:r>
-            <a:r>
-              <a:rPr lang="de-DE" sz="1200" dirty="0" err="1"/>
-              <a:t>maßnahme</a:t>
-            </a:r>
-            <a:r>
-              <a:rPr lang="de-DE" sz="1200" dirty="0"/>
-              <a:t> durch </a:t>
-            </a:r>
-            <a:r>
-              <a:rPr lang="de-DE" sz="1200" dirty="0" err="1"/>
-              <a:t>einführung</a:t>
-            </a:r>
-            <a:r>
-              <a:rPr lang="de-DE" sz="1200" dirty="0"/>
-              <a:t> weniger </a:t>
-            </a:r>
-            <a:r>
-              <a:rPr lang="de-DE" sz="1200" dirty="0" err="1"/>
-              <a:t>datentypen</a:t>
-            </a:r>
-            <a:r>
-              <a:rPr lang="de-DE" sz="1200" dirty="0"/>
+              <a:rPr lang="de-DE" dirty="0" err="1"/>
+              <a:t>stuff</a:t>
+            </a:r>
+            <a:r>
+              <a:rPr lang="de-DE" dirty="0"/>
               <a:t>)</a:t>
             </a:r>
           </a:p>
@@ -1265,6 +1231,357 @@
             <a:fld id="{92C84FA6-9D13-4F89-9D5F-507040849F9F}" type="slidenum">
               <a:rPr lang="de-DE" altLang="de-DE" smtClean="0"/>
               <a:pPr/>
+              <a:t>14</a:t>
+            </a:fld>
+            <a:endParaRPr lang="de-DE" altLang="de-DE"/>
+          </a:p>
+        </p:txBody>
+      </p:sp>
+    </p:spTree>
+    <p:extLst>
+      <p:ext uri="{BB962C8B-B14F-4D97-AF65-F5344CB8AC3E}">
+        <p14:creationId xmlns:p14="http://schemas.microsoft.com/office/powerpoint/2010/main" val="2926927885"/>
+      </p:ext>
+    </p:extLst>
+  </p:cSld>
+  <p:clrMapOvr>
+    <a:masterClrMapping/>
+  </p:clrMapOvr>
+</p:notes>
+</file>
+
+<file path=ppt/notesSlides/notesSlide4.xml><?xml version="1.0" encoding="utf-8"?>
+<p:notes xmlns:a="http://schemas.openxmlformats.org/drawingml/2006/main" xmlns:r="http://schemas.openxmlformats.org/officeDocument/2006/relationships" xmlns:p="http://schemas.openxmlformats.org/presentationml/2006/main">
+  <p:cSld>
+    <p:spTree>
+      <p:nvGrpSpPr>
+        <p:cNvPr id="1" name=""/>
+        <p:cNvGrpSpPr/>
+        <p:nvPr/>
+      </p:nvGrpSpPr>
+      <p:grpSpPr>
+        <a:xfrm>
+          <a:off x="0" y="0"/>
+          <a:ext cx="0" cy="0"/>
+          <a:chOff x="0" y="0"/>
+          <a:chExt cx="0" cy="0"/>
+        </a:xfrm>
+      </p:grpSpPr>
+      <p:sp>
+        <p:nvSpPr>
+          <p:cNvPr id="2" name="Folienbildplatzhalter 1"/>
+          <p:cNvSpPr>
+            <a:spLocks noGrp="1" noRot="1" noChangeAspect="1"/>
+          </p:cNvSpPr>
+          <p:nvPr>
+            <p:ph type="sldImg"/>
+          </p:nvPr>
+        </p:nvSpPr>
+        <p:spPr/>
+      </p:sp>
+      <p:sp>
+        <p:nvSpPr>
+          <p:cNvPr id="3" name="Notizenplatzhalter 2"/>
+          <p:cNvSpPr>
+            <a:spLocks noGrp="1"/>
+          </p:cNvSpPr>
+          <p:nvPr>
+            <p:ph type="body" idx="1"/>
+          </p:nvPr>
+        </p:nvSpPr>
+        <p:spPr/>
+        <p:txBody>
+          <a:bodyPr/>
+          <a:lstStyle/>
+          <a:p>
+            <a:pPr marL="285750" indent="-285750">
+              <a:buFont typeface="Arial" panose="020B0604020202020204" pitchFamily="34" charset="0"/>
+              <a:buChar char="•"/>
+            </a:pPr>
+            <a:r>
+              <a:rPr lang="de-DE" sz="1200" dirty="0"/>
+              <a:t>Gerichtete azyklische Graphen als Repräsentation der Datenstruktur (+1, Strukturierter Ansatz zur Datenspeicherung), (+2, keine </a:t>
+            </a:r>
+            <a:r>
+              <a:rPr lang="de-DE" sz="1200" dirty="0" err="1"/>
+              <a:t>änderung</a:t>
+            </a:r>
+            <a:r>
+              <a:rPr lang="de-DE" sz="1200" dirty="0"/>
+              <a:t> in </a:t>
+            </a:r>
+            <a:r>
+              <a:rPr lang="de-DE" sz="1200" dirty="0" err="1"/>
+              <a:t>dateien</a:t>
+            </a:r>
+            <a:r>
+              <a:rPr lang="de-DE" sz="1200" dirty="0"/>
+              <a:t> bedeutet keine </a:t>
+            </a:r>
+            <a:r>
+              <a:rPr lang="de-DE" sz="1200" dirty="0" err="1"/>
+              <a:t>änderung</a:t>
+            </a:r>
+            <a:r>
+              <a:rPr lang="de-DE" sz="1200" dirty="0"/>
+              <a:t> im </a:t>
+            </a:r>
+            <a:r>
+              <a:rPr lang="de-DE" sz="1200" dirty="0" err="1"/>
+              <a:t>graph</a:t>
+            </a:r>
+            <a:r>
+              <a:rPr lang="de-DE" sz="1200" dirty="0"/>
+              <a:t>), (+3, unterschiedliche </a:t>
+            </a:r>
+            <a:r>
+              <a:rPr lang="de-DE" sz="1200" dirty="0" err="1"/>
+              <a:t>graphen</a:t>
+            </a:r>
+            <a:r>
+              <a:rPr lang="de-DE" sz="1200" dirty="0"/>
+              <a:t> können </a:t>
+            </a:r>
+            <a:r>
+              <a:rPr lang="de-DE" sz="1200" dirty="0" err="1"/>
+              <a:t>gemerged</a:t>
+            </a:r>
+            <a:r>
+              <a:rPr lang="de-DE" sz="1200" dirty="0"/>
+              <a:t> werden und gleiche teile beibehalten werden, ermöglicht </a:t>
+            </a:r>
+            <a:r>
+              <a:rPr lang="de-DE" sz="1200" dirty="0" err="1"/>
+              <a:t>branching</a:t>
+            </a:r>
+            <a:r>
+              <a:rPr lang="de-DE" sz="1200" dirty="0"/>
+              <a:t>), (-5, </a:t>
+            </a:r>
+            <a:r>
+              <a:rPr lang="de-DE" sz="1200" dirty="0" err="1"/>
+              <a:t>repository</a:t>
+            </a:r>
+            <a:r>
+              <a:rPr lang="de-DE" sz="1200" dirty="0"/>
+              <a:t> speichert nicht nur </a:t>
+            </a:r>
+            <a:r>
+              <a:rPr lang="de-DE" sz="1200" dirty="0" err="1"/>
+              <a:t>diffs</a:t>
+            </a:r>
+            <a:r>
+              <a:rPr lang="de-DE" sz="1200" dirty="0"/>
+              <a:t> der </a:t>
+            </a:r>
+            <a:r>
+              <a:rPr lang="de-DE" sz="1200" dirty="0" err="1"/>
+              <a:t>dateien</a:t>
+            </a:r>
+            <a:r>
+              <a:rPr lang="de-DE" sz="1200" dirty="0"/>
+              <a:t> sondern immer den gesamten </a:t>
+            </a:r>
+            <a:r>
+              <a:rPr lang="de-DE" sz="1200" dirty="0" err="1"/>
+              <a:t>graph</a:t>
+            </a:r>
+            <a:r>
+              <a:rPr lang="de-DE" sz="1200" dirty="0"/>
+              <a:t> und </a:t>
+            </a:r>
+            <a:r>
+              <a:rPr lang="de-DE" sz="1200" dirty="0" err="1"/>
+              <a:t>dateiinhalte</a:t>
+            </a:r>
+            <a:r>
+              <a:rPr lang="de-DE" sz="1200" dirty="0"/>
+              <a:t>)</a:t>
+            </a:r>
+          </a:p>
+          <a:p>
+            <a:pPr marL="285750" indent="-285750">
+              <a:buFont typeface="Arial" panose="020B0604020202020204" pitchFamily="34" charset="0"/>
+              <a:buChar char="•"/>
+            </a:pPr>
+            <a:endParaRPr lang="de-DE" sz="1200" dirty="0"/>
+          </a:p>
+          <a:p>
+            <a:pPr marL="285750" indent="-285750">
+              <a:buFont typeface="Arial" panose="020B0604020202020204" pitchFamily="34" charset="0"/>
+              <a:buChar char="•"/>
+            </a:pPr>
+            <a:r>
+              <a:rPr lang="de-DE" sz="1200" dirty="0"/>
+              <a:t>SHAs als Identifier für GIT Objekte (+2, gleicher SHA heißt keine Änderung), (+3, </a:t>
+            </a:r>
+            <a:r>
+              <a:rPr lang="de-DE" sz="1200" dirty="0" err="1"/>
+              <a:t>unique</a:t>
+            </a:r>
+            <a:r>
+              <a:rPr lang="de-DE" sz="1200" dirty="0"/>
+              <a:t> </a:t>
+            </a:r>
+            <a:r>
+              <a:rPr lang="de-DE" sz="1200" dirty="0" err="1"/>
+              <a:t>identifier</a:t>
+            </a:r>
+            <a:r>
+              <a:rPr lang="de-DE" sz="1200" dirty="0"/>
+              <a:t> benötigt um unterschiedliche </a:t>
+            </a:r>
+            <a:r>
+              <a:rPr lang="de-DE" sz="1200" dirty="0" err="1"/>
+              <a:t>bearbeiter</a:t>
+            </a:r>
+            <a:r>
+              <a:rPr lang="de-DE" sz="1200" dirty="0"/>
+              <a:t> festzustellen), (+4, bei kopieren oder anderer </a:t>
+            </a:r>
+            <a:r>
+              <a:rPr lang="de-DE" sz="1200" dirty="0" err="1"/>
+              <a:t>datenkorrumpierung</a:t>
+            </a:r>
+            <a:r>
+              <a:rPr lang="de-DE" sz="1200" dirty="0"/>
+              <a:t> ändert sich der SHA), (+5, vereinfacht </a:t>
+            </a:r>
+            <a:r>
+              <a:rPr lang="de-DE" sz="1200" dirty="0" err="1"/>
+              <a:t>festellen</a:t>
+            </a:r>
+            <a:r>
+              <a:rPr lang="de-DE" sz="1200" dirty="0"/>
+              <a:t> von </a:t>
+            </a:r>
+            <a:r>
+              <a:rPr lang="de-DE" sz="1200" dirty="0" err="1"/>
+              <a:t>diff</a:t>
+            </a:r>
+            <a:r>
+              <a:rPr lang="de-DE" sz="1200" dirty="0"/>
+              <a:t> zwischen zwei </a:t>
+            </a:r>
+            <a:r>
+              <a:rPr lang="de-DE" sz="1200" dirty="0" err="1"/>
+              <a:t>dateien</a:t>
+            </a:r>
+            <a:r>
+              <a:rPr lang="de-DE" sz="1200" dirty="0"/>
+              <a:t>)</a:t>
+            </a:r>
+          </a:p>
+          <a:p>
+            <a:pPr marL="285750" indent="-285750">
+              <a:buFont typeface="Arial" panose="020B0604020202020204" pitchFamily="34" charset="0"/>
+              <a:buChar char="•"/>
+            </a:pPr>
+            <a:endParaRPr lang="de-DE" sz="1200" dirty="0"/>
+          </a:p>
+          <a:p>
+            <a:pPr marL="285750" indent="-285750">
+              <a:buFont typeface="Arial" panose="020B0604020202020204" pitchFamily="34" charset="0"/>
+              <a:buChar char="•"/>
+            </a:pPr>
+            <a:r>
+              <a:rPr lang="de-DE" sz="1200" dirty="0"/>
+              <a:t>Trennung von lokalem und remote Repository (+1, </a:t>
+            </a:r>
+            <a:r>
+              <a:rPr lang="de-DE" sz="1200" dirty="0" err="1"/>
+              <a:t>versionierung</a:t>
+            </a:r>
+            <a:r>
+              <a:rPr lang="de-DE" sz="1200" dirty="0"/>
+              <a:t> gleichzeitig mit (</a:t>
+            </a:r>
+            <a:r>
+              <a:rPr lang="de-DE" sz="1200" dirty="0" err="1"/>
+              <a:t>server</a:t>
+            </a:r>
+            <a:r>
+              <a:rPr lang="de-DE" sz="1200" dirty="0"/>
+              <a:t>)-backup), (+3, offline arbeiten möglich), (+5, wegen offline-fähigkeit)</a:t>
+            </a:r>
+          </a:p>
+          <a:p>
+            <a:pPr marL="285750" indent="-285750">
+              <a:buFont typeface="Arial" panose="020B0604020202020204" pitchFamily="34" charset="0"/>
+              <a:buChar char="•"/>
+            </a:pPr>
+            <a:endParaRPr lang="de-DE" sz="1200" dirty="0"/>
+          </a:p>
+          <a:p>
+            <a:pPr marL="285750" indent="-285750">
+              <a:buFont typeface="Arial" panose="020B0604020202020204" pitchFamily="34" charset="0"/>
+              <a:buChar char="•"/>
+            </a:pPr>
+            <a:r>
+              <a:rPr lang="de-DE" sz="1200" dirty="0"/>
+              <a:t>Definition vier primitiver GIT-Datentypen (+1, </a:t>
+            </a:r>
+            <a:r>
+              <a:rPr lang="de-DE" sz="1200" dirty="0" err="1"/>
+              <a:t>möglicht</a:t>
+            </a:r>
+            <a:r>
+              <a:rPr lang="de-DE" sz="1200" dirty="0"/>
+              <a:t> wenig komplexe und </a:t>
+            </a:r>
+            <a:r>
+              <a:rPr lang="de-DE" sz="1200" dirty="0" err="1"/>
+              <a:t>gleichzeit</a:t>
+            </a:r>
+            <a:r>
+              <a:rPr lang="de-DE" sz="1200" dirty="0"/>
+              <a:t> strukturgebende </a:t>
+            </a:r>
+            <a:r>
+              <a:rPr lang="de-DE" sz="1200" dirty="0" err="1"/>
+              <a:t>maßnahme</a:t>
+            </a:r>
+            <a:r>
+              <a:rPr lang="de-DE" sz="1200" dirty="0"/>
+              <a:t> durch </a:t>
+            </a:r>
+            <a:r>
+              <a:rPr lang="de-DE" sz="1200" dirty="0" err="1"/>
+              <a:t>einführung</a:t>
+            </a:r>
+            <a:r>
+              <a:rPr lang="de-DE" sz="1200" dirty="0"/>
+              <a:t> weniger </a:t>
+            </a:r>
+            <a:r>
+              <a:rPr lang="de-DE" sz="1200" dirty="0" err="1"/>
+              <a:t>datentypen</a:t>
+            </a:r>
+            <a:r>
+              <a:rPr lang="de-DE" sz="1200" dirty="0"/>
+              <a:t>)</a:t>
+            </a:r>
+          </a:p>
+        </p:txBody>
+      </p:sp>
+      <p:sp>
+        <p:nvSpPr>
+          <p:cNvPr id="4" name="Foliennummernplatzhalter 3"/>
+          <p:cNvSpPr>
+            <a:spLocks noGrp="1"/>
+          </p:cNvSpPr>
+          <p:nvPr>
+            <p:ph type="sldNum" sz="quarter" idx="5"/>
+          </p:nvPr>
+        </p:nvSpPr>
+        <p:spPr/>
+        <p:txBody>
+          <a:bodyPr/>
+          <a:lstStyle/>
+          <a:p>
+            <a:fld id="{92C84FA6-9D13-4F89-9D5F-507040849F9F}" type="slidenum">
+              <a:rPr lang="de-DE" altLang="de-DE" smtClean="0"/>
+              <a:pPr/>
               <a:t>15</a:t>
             </a:fld>
             <a:endParaRPr lang="de-DE" altLang="de-DE"/>
@@ -1284,7 +1601,7 @@
 </p:notes>
 </file>
 
-<file path=ppt/notesSlides/notesSlide3.xml><?xml version="1.0" encoding="utf-8"?>
+<file path=ppt/notesSlides/notesSlide5.xml><?xml version="1.0" encoding="utf-8"?>
 <p:notes xmlns:a="http://schemas.openxmlformats.org/drawingml/2006/main" xmlns:r="http://schemas.openxmlformats.org/officeDocument/2006/relationships" xmlns:p="http://schemas.openxmlformats.org/presentationml/2006/main">
   <p:cSld>
     <p:spTree>
@@ -2151,7 +2468,7 @@
           <a:p>
             <a:fld id="{F0D12A71-A58E-40BE-A08F-1058245CE28C}" type="datetime1">
               <a:rPr lang="de-DE" altLang="de-DE" sz="800" smtClean="0"/>
-              <a:t>15.01.20</a:t>
+              <a:t>18.01.2020</a:t>
             </a:fld>
             <a:r>
               <a:rPr lang="de-DE" altLang="de-DE" sz="800" dirty="0"/>
@@ -2159,7 +2476,7 @@
             </a:r>
             <a:fld id="{5103C2F5-CAD6-4020-8144-FE16A2C7B9DC}" type="slidenum">
               <a:rPr lang="de-DE" altLang="de-DE" sz="800" smtClean="0"/>
-              <a:t>‹Nr.›</a:t>
+              <a:t>‹#›</a:t>
             </a:fld>
             <a:endParaRPr lang="de-DE" sz="800" dirty="0"/>
           </a:p>
@@ -3377,33 +3694,16 @@
           <a:p>
             <a:r>
               <a:rPr lang="de-DE" dirty="0"/>
-              <a:t>Architektur der Datentypen</a:t>
-            </a:r>
-          </a:p>
-        </p:txBody>
-      </p:sp>
-      <p:sp>
-        <p:nvSpPr>
-          <p:cNvPr id="3" name="Inhaltsplatzhalter 2">
-            <a:extLst>
-              <a:ext uri="{FF2B5EF4-FFF2-40B4-BE49-F238E27FC236}">
-                <a16:creationId xmlns:a16="http://schemas.microsoft.com/office/drawing/2014/main" id="{A7DF450C-E2A2-4EFC-ACC2-97D8EBDC63AD}"/>
-              </a:ext>
-            </a:extLst>
-          </p:cNvPr>
-          <p:cNvSpPr>
-            <a:spLocks noGrp="1"/>
-          </p:cNvSpPr>
-          <p:nvPr>
-            <p:ph idx="1"/>
-          </p:nvPr>
-        </p:nvSpPr>
-        <p:spPr/>
-        <p:txBody>
-          <a:bodyPr/>
-          <a:lstStyle/>
-          <a:p>
-            <a:endParaRPr lang="de-DE"/>
+              <a:t>Architektur der Datentypen: </a:t>
+            </a:r>
+            <a:r>
+              <a:rPr lang="de-DE" dirty="0" err="1"/>
+              <a:t>Git</a:t>
+            </a:r>
+            <a:r>
+              <a:rPr lang="de-DE" dirty="0"/>
+              <a:t>-References</a:t>
+            </a:r>
           </a:p>
         </p:txBody>
       </p:sp>
@@ -3851,10 +4151,44 @@
           </a:p>
         </p:txBody>
       </p:sp>
+      <p:pic>
+        <p:nvPicPr>
+          <p:cNvPr id="21" name="Content Placeholder 20">
+            <a:extLst>
+              <a:ext uri="{FF2B5EF4-FFF2-40B4-BE49-F238E27FC236}">
+                <a16:creationId xmlns:a16="http://schemas.microsoft.com/office/drawing/2014/main" id="{28D07755-87D5-4013-8382-FBF77D6F8496}"/>
+              </a:ext>
+            </a:extLst>
+          </p:cNvPr>
+          <p:cNvPicPr>
+            <a:picLocks noGrp="1" noChangeAspect="1"/>
+          </p:cNvPicPr>
+          <p:nvPr>
+            <p:ph idx="1"/>
+          </p:nvPr>
+        </p:nvPicPr>
+        <p:blipFill rotWithShape="1">
+          <a:blip r:embed="rId3">
+            <a:extLst>
+              <a:ext uri="{28A0092B-C50C-407E-A947-70E740481C1C}">
+                <a14:useLocalDpi xmlns:a14="http://schemas.microsoft.com/office/drawing/2010/main" val="0"/>
+              </a:ext>
+            </a:extLst>
+          </a:blip>
+          <a:srcRect l="3511" t="5471" r="6504" b="11054"/>
+          <a:stretch/>
+        </p:blipFill>
+        <p:spPr>
+          <a:xfrm>
+            <a:off x="1183214" y="1808820"/>
+            <a:ext cx="10538411" cy="3495668"/>
+          </a:xfrm>
+        </p:spPr>
+      </p:pic>
     </p:spTree>
     <p:extLst>
       <p:ext uri="{BB962C8B-B14F-4D97-AF65-F5344CB8AC3E}">
-        <p14:creationId xmlns:p14="http://schemas.microsoft.com/office/powerpoint/2010/main" val="228614313"/>
+        <p14:creationId xmlns:p14="http://schemas.microsoft.com/office/powerpoint/2010/main" val="4099024290"/>
       </p:ext>
     </p:extLst>
   </p:cSld>
@@ -10344,36 +10678,6 @@
           </a:p>
         </p:txBody>
       </p:sp>
-      <p:pic>
-        <p:nvPicPr>
-          <p:cNvPr id="13" name="Grafik 12">
-            <a:extLst>
-              <a:ext uri="{FF2B5EF4-FFF2-40B4-BE49-F238E27FC236}">
-                <a16:creationId xmlns:a16="http://schemas.microsoft.com/office/drawing/2014/main" id="{76CACC09-E94D-474A-A0E9-4D9E9156779A}"/>
-              </a:ext>
-            </a:extLst>
-          </p:cNvPr>
-          <p:cNvPicPr>
-            <a:picLocks noChangeAspect="1"/>
-          </p:cNvPicPr>
-          <p:nvPr/>
-        </p:nvPicPr>
-        <p:blipFill>
-          <a:blip r:embed="rId2"/>
-          <a:stretch>
-            <a:fillRect/>
-          </a:stretch>
-        </p:blipFill>
-        <p:spPr>
-          <a:xfrm>
-            <a:off x="3620725" y="953725"/>
-            <a:ext cx="4617322" cy="4617322"/>
-          </a:xfrm>
-          <a:prstGeom prst="rect">
-            <a:avLst/>
-          </a:prstGeom>
-        </p:spPr>
-      </p:pic>
       <p:sp>
         <p:nvSpPr>
           <p:cNvPr id="14" name="Textfeld 13">
@@ -10418,6 +10722,42 @@
           </a:p>
         </p:txBody>
       </p:sp>
+      <p:pic>
+        <p:nvPicPr>
+          <p:cNvPr id="15" name="Picture 14">
+            <a:extLst>
+              <a:ext uri="{FF2B5EF4-FFF2-40B4-BE49-F238E27FC236}">
+                <a16:creationId xmlns:a16="http://schemas.microsoft.com/office/drawing/2014/main" id="{68BB650E-F5E8-4B16-8D11-E73A8ABD89B5}"/>
+              </a:ext>
+            </a:extLst>
+          </p:cNvPr>
+          <p:cNvPicPr>
+            <a:picLocks noChangeAspect="1"/>
+          </p:cNvPicPr>
+          <p:nvPr/>
+        </p:nvPicPr>
+        <p:blipFill>
+          <a:blip r:embed="rId2">
+            <a:extLst>
+              <a:ext uri="{28A0092B-C50C-407E-A947-70E740481C1C}">
+                <a14:useLocalDpi xmlns:a14="http://schemas.microsoft.com/office/drawing/2010/main" val="0"/>
+              </a:ext>
+            </a:extLst>
+          </a:blip>
+          <a:stretch>
+            <a:fillRect/>
+          </a:stretch>
+        </p:blipFill>
+        <p:spPr>
+          <a:xfrm>
+            <a:off x="3186883" y="1571447"/>
+            <a:ext cx="5945234" cy="3715106"/>
+          </a:xfrm>
+          <a:prstGeom prst="rect">
+            <a:avLst/>
+          </a:prstGeom>
+        </p:spPr>
+      </p:pic>
     </p:spTree>
     <p:extLst>
       <p:ext uri="{BB962C8B-B14F-4D97-AF65-F5344CB8AC3E}">
@@ -19052,33 +19392,16 @@
           <a:p>
             <a:r>
               <a:rPr lang="de-DE" dirty="0"/>
-              <a:t>Architektur der Datentypen</a:t>
-            </a:r>
-          </a:p>
-        </p:txBody>
-      </p:sp>
-      <p:sp>
-        <p:nvSpPr>
-          <p:cNvPr id="3" name="Inhaltsplatzhalter 2">
-            <a:extLst>
-              <a:ext uri="{FF2B5EF4-FFF2-40B4-BE49-F238E27FC236}">
-                <a16:creationId xmlns:a16="http://schemas.microsoft.com/office/drawing/2014/main" id="{AB5DAD74-10C5-43CF-9DE2-25E796E71D5E}"/>
-              </a:ext>
-            </a:extLst>
-          </p:cNvPr>
-          <p:cNvSpPr>
-            <a:spLocks noGrp="1"/>
-          </p:cNvSpPr>
-          <p:nvPr>
-            <p:ph idx="1"/>
-          </p:nvPr>
-        </p:nvSpPr>
-        <p:spPr/>
-        <p:txBody>
-          <a:bodyPr/>
-          <a:lstStyle/>
-          <a:p>
-            <a:endParaRPr lang="de-DE"/>
+              <a:t>Architektur der Datentypen: </a:t>
+            </a:r>
+            <a:r>
+              <a:rPr lang="de-DE" dirty="0" err="1"/>
+              <a:t>Git</a:t>
+            </a:r>
+            <a:r>
+              <a:rPr lang="de-DE" dirty="0"/>
+              <a:t>-Objects</a:t>
+            </a:r>
           </a:p>
         </p:txBody>
       </p:sp>
@@ -19526,10 +19849,80 @@
           </a:p>
         </p:txBody>
       </p:sp>
+      <p:pic>
+        <p:nvPicPr>
+          <p:cNvPr id="21" name="Picture 20">
+            <a:extLst>
+              <a:ext uri="{FF2B5EF4-FFF2-40B4-BE49-F238E27FC236}">
+                <a16:creationId xmlns:a16="http://schemas.microsoft.com/office/drawing/2014/main" id="{E24400A2-67B5-4296-8802-D2D8573246D1}"/>
+              </a:ext>
+            </a:extLst>
+          </p:cNvPr>
+          <p:cNvPicPr>
+            <a:picLocks noChangeAspect="1"/>
+          </p:cNvPicPr>
+          <p:nvPr/>
+        </p:nvPicPr>
+        <p:blipFill rotWithShape="1">
+          <a:blip r:embed="rId3">
+            <a:extLst>
+              <a:ext uri="{28A0092B-C50C-407E-A947-70E740481C1C}">
+                <a14:useLocalDpi xmlns:a14="http://schemas.microsoft.com/office/drawing/2010/main" val="0"/>
+              </a:ext>
+            </a:extLst>
+          </a:blip>
+          <a:srcRect l="4448" t="4661" r="4357" b="3804"/>
+          <a:stretch/>
+        </p:blipFill>
+        <p:spPr>
+          <a:xfrm>
+            <a:off x="1100445" y="1088740"/>
+            <a:ext cx="5535606" cy="4725525"/>
+          </a:xfrm>
+          <a:prstGeom prst="rect">
+            <a:avLst/>
+          </a:prstGeom>
+        </p:spPr>
+      </p:pic>
+      <p:pic>
+        <p:nvPicPr>
+          <p:cNvPr id="23" name="Picture 22">
+            <a:extLst>
+              <a:ext uri="{FF2B5EF4-FFF2-40B4-BE49-F238E27FC236}">
+                <a16:creationId xmlns:a16="http://schemas.microsoft.com/office/drawing/2014/main" id="{C200ECA4-81A7-4DEC-A5B3-C008A75EE357}"/>
+              </a:ext>
+            </a:extLst>
+          </p:cNvPr>
+          <p:cNvPicPr>
+            <a:picLocks noChangeAspect="1"/>
+          </p:cNvPicPr>
+          <p:nvPr/>
+        </p:nvPicPr>
+        <p:blipFill rotWithShape="1">
+          <a:blip r:embed="rId4">
+            <a:extLst>
+              <a:ext uri="{28A0092B-C50C-407E-A947-70E740481C1C}">
+                <a14:useLocalDpi xmlns:a14="http://schemas.microsoft.com/office/drawing/2010/main" val="0"/>
+              </a:ext>
+            </a:extLst>
+          </a:blip>
+          <a:srcRect l="3540" t="6295" r="3261" b="4736"/>
+          <a:stretch/>
+        </p:blipFill>
+        <p:spPr>
+          <a:xfrm>
+            <a:off x="6996100" y="1178750"/>
+            <a:ext cx="4365485" cy="4531502"/>
+          </a:xfrm>
+          <a:prstGeom prst="rect">
+            <a:avLst/>
+          </a:prstGeom>
+        </p:spPr>
+      </p:pic>
     </p:spTree>
     <p:extLst>
       <p:ext uri="{BB962C8B-B14F-4D97-AF65-F5344CB8AC3E}">
-        <p14:creationId xmlns:p14="http://schemas.microsoft.com/office/powerpoint/2010/main" val="950008428"/>
+        <p14:creationId xmlns:p14="http://schemas.microsoft.com/office/powerpoint/2010/main" val="3953450524"/>
       </p:ext>
     </p:extLst>
   </p:cSld>

</xml_diff>